<commit_message>
add repo link to ppt
</commit_message>
<xml_diff>
--- a/Presentation.pptx
+++ b/Presentation.pptx
@@ -257,7 +257,7 @@
       <p15:sldGuideLst xmlns:p15="http://schemas.microsoft.com/office/powerpoint/2012/main"/>
     </p:ext>
     <p:ext uri="http://customooxmlschemas.google.com/">
-      <go:slidesCustomData xmlns="" xmlns:mc="http://schemas.openxmlformats.org/markup-compatibility/2006" xmlns:mv="urn:schemas-microsoft-com:mac:vml" xmlns:c="http://schemas.openxmlformats.org/drawingml/2006/chart" xmlns:dgm="http://schemas.openxmlformats.org/drawingml/2006/diagram" xmlns:o="urn:schemas-microsoft-com:office:office" xmlns:v="urn:schemas-microsoft-com:vml" xmlns:pvml="urn:schemas-microsoft-com:office:powerpoint" xmlns:com="http://schemas.openxmlformats.org/drawingml/2006/compatibility" xmlns:p14="http://schemas.microsoft.com/office/powerpoint/2010/main" xmlns:p15="http://schemas.microsoft.com/office/powerpoint/2012/main" xmlns:ahyp="http://schemas.microsoft.com/office/drawing/2018/hyperlinkcolor" xmlns:go="http://customooxmlschemas.google.com/" r:id="rId29" roundtripDataSignature="AMtx7mgh2IXhtKZ+7hDrzPCbxSOGYngaRQ=="/>
+      <go:slidesCustomData xmlns:go="http://customooxmlschemas.google.com/" xmlns:ahyp="http://schemas.microsoft.com/office/drawing/2018/hyperlinkcolor" xmlns:p15="http://schemas.microsoft.com/office/powerpoint/2012/main" xmlns:p14="http://schemas.microsoft.com/office/powerpoint/2010/main" xmlns:com="http://schemas.openxmlformats.org/drawingml/2006/compatibility" xmlns:pvml="urn:schemas-microsoft-com:office:powerpoint" xmlns:v="urn:schemas-microsoft-com:vml" xmlns:o="urn:schemas-microsoft-com:office:office" xmlns:dgm="http://schemas.openxmlformats.org/drawingml/2006/diagram" xmlns:c="http://schemas.openxmlformats.org/drawingml/2006/chart" xmlns:mv="urn:schemas-microsoft-com:mac:vml" xmlns:mc="http://schemas.openxmlformats.org/markup-compatibility/2006" xmlns="" r:id="rId29" roundtripDataSignature="AMtx7mgh2IXhtKZ+7hDrzPCbxSOGYngaRQ=="/>
     </p:ext>
   </p:extLst>
 </p:presentation>
@@ -10645,14 +10645,17 @@
           <a:lstStyle/>
           <a:p>
             <a:r>
-              <a:rPr lang="en-US" altLang="zh-TW" dirty="0">
+              <a:rPr lang="en-US" altLang="zh-TW">
                 <a:hlinkClick r:id="rId2"/>
               </a:rPr>
-              <a:t>https://github.com/andy39866821/AAHLS-LAB-B</a:t>
+              <a:t>https://github.com/andy39866821/AAHLS-LabB-Matrix-Multiplication</a:t>
             </a:r>
-            <a:endParaRPr lang="en-US" altLang="zh-TW" dirty="0"/>
+            <a:endParaRPr lang="en-US" altLang="zh-TW"/>
           </a:p>
           <a:p>
+            <a:pPr marL="88900" indent="0">
+              <a:buNone/>
+            </a:pPr>
             <a:endParaRPr lang="zh-TW" altLang="en-US" dirty="0"/>
           </a:p>
         </p:txBody>

</xml_diff>